<commit_message>
lecture 1 split in two parts. Minor fixes in presentations
</commit_message>
<xml_diff>
--- a/pt2/lectures/lecture5/lecture5.pptx
+++ b/pt2/lectures/lecture5/lecture5.pptx
@@ -845,7 +845,7 @@
           <a:p>
             <a:fld id="{68854FD7-F343-4A42-89E7-0EA4AA30A707}" type="datetimeFigureOut">
               <a:rPr lang="en-US" smtClean="0"/>
-              <a:t>11/12/2021</a:t>
+              <a:t>9/12/2022</a:t>
             </a:fld>
             <a:endParaRPr lang="en-US"/>
           </a:p>
@@ -1096,7 +1096,7 @@
           <a:p>
             <a:fld id="{68854FD7-F343-4A42-89E7-0EA4AA30A707}" type="datetimeFigureOut">
               <a:rPr lang="en-US" smtClean="0"/>
-              <a:t>11/12/2021</a:t>
+              <a:t>9/12/2022</a:t>
             </a:fld>
             <a:endParaRPr lang="en-US"/>
           </a:p>
@@ -1410,7 +1410,7 @@
           <a:p>
             <a:fld id="{68854FD7-F343-4A42-89E7-0EA4AA30A707}" type="datetimeFigureOut">
               <a:rPr lang="en-US" smtClean="0"/>
-              <a:t>11/12/2021</a:t>
+              <a:t>9/12/2022</a:t>
             </a:fld>
             <a:endParaRPr lang="en-US"/>
           </a:p>
@@ -1751,7 +1751,7 @@
           <a:p>
             <a:fld id="{68854FD7-F343-4A42-89E7-0EA4AA30A707}" type="datetimeFigureOut">
               <a:rPr lang="en-US" smtClean="0"/>
-              <a:t>11/12/2021</a:t>
+              <a:t>9/12/2022</a:t>
             </a:fld>
             <a:endParaRPr lang="en-US"/>
           </a:p>
@@ -2065,7 +2065,7 @@
           <a:p>
             <a:fld id="{68854FD7-F343-4A42-89E7-0EA4AA30A707}" type="datetimeFigureOut">
               <a:rPr lang="en-US" smtClean="0"/>
-              <a:t>11/12/2021</a:t>
+              <a:t>9/12/2022</a:t>
             </a:fld>
             <a:endParaRPr lang="en-US"/>
           </a:p>
@@ -2458,7 +2458,7 @@
           <a:p>
             <a:fld id="{68854FD7-F343-4A42-89E7-0EA4AA30A707}" type="datetimeFigureOut">
               <a:rPr lang="en-US" smtClean="0"/>
-              <a:t>11/12/2021</a:t>
+              <a:t>9/12/2022</a:t>
             </a:fld>
             <a:endParaRPr lang="en-US"/>
           </a:p>
@@ -2628,7 +2628,7 @@
           <a:p>
             <a:fld id="{68854FD7-F343-4A42-89E7-0EA4AA30A707}" type="datetimeFigureOut">
               <a:rPr lang="en-US" smtClean="0"/>
-              <a:t>11/12/2021</a:t>
+              <a:t>9/12/2022</a:t>
             </a:fld>
             <a:endParaRPr lang="en-US"/>
           </a:p>
@@ -2808,7 +2808,7 @@
           <a:p>
             <a:fld id="{68854FD7-F343-4A42-89E7-0EA4AA30A707}" type="datetimeFigureOut">
               <a:rPr lang="en-US" smtClean="0"/>
-              <a:t>11/12/2021</a:t>
+              <a:t>9/12/2022</a:t>
             </a:fld>
             <a:endParaRPr lang="en-US"/>
           </a:p>
@@ -2984,7 +2984,7 @@
           <a:p>
             <a:fld id="{68854FD7-F343-4A42-89E7-0EA4AA30A707}" type="datetimeFigureOut">
               <a:rPr lang="en-US" smtClean="0"/>
-              <a:t>11/12/2021</a:t>
+              <a:t>9/12/2022</a:t>
             </a:fld>
             <a:endParaRPr lang="en-US"/>
           </a:p>
@@ -3231,7 +3231,7 @@
           <a:p>
             <a:fld id="{68854FD7-F343-4A42-89E7-0EA4AA30A707}" type="datetimeFigureOut">
               <a:rPr lang="en-US" smtClean="0"/>
-              <a:t>11/12/2021</a:t>
+              <a:t>9/12/2022</a:t>
             </a:fld>
             <a:endParaRPr lang="en-US"/>
           </a:p>
@@ -3463,7 +3463,7 @@
           <a:p>
             <a:fld id="{68854FD7-F343-4A42-89E7-0EA4AA30A707}" type="datetimeFigureOut">
               <a:rPr lang="en-US" smtClean="0"/>
-              <a:t>11/12/2021</a:t>
+              <a:t>9/12/2022</a:t>
             </a:fld>
             <a:endParaRPr lang="en-US"/>
           </a:p>
@@ -3837,7 +3837,7 @@
           <a:p>
             <a:fld id="{68854FD7-F343-4A42-89E7-0EA4AA30A707}" type="datetimeFigureOut">
               <a:rPr lang="en-US" smtClean="0"/>
-              <a:t>11/12/2021</a:t>
+              <a:t>9/12/2022</a:t>
             </a:fld>
             <a:endParaRPr lang="en-US"/>
           </a:p>
@@ -3960,7 +3960,7 @@
           <a:p>
             <a:fld id="{68854FD7-F343-4A42-89E7-0EA4AA30A707}" type="datetimeFigureOut">
               <a:rPr lang="en-US" smtClean="0"/>
-              <a:t>11/12/2021</a:t>
+              <a:t>9/12/2022</a:t>
             </a:fld>
             <a:endParaRPr lang="en-US"/>
           </a:p>
@@ -4055,7 +4055,7 @@
           <a:p>
             <a:fld id="{68854FD7-F343-4A42-89E7-0EA4AA30A707}" type="datetimeFigureOut">
               <a:rPr lang="en-US" smtClean="0"/>
-              <a:t>11/12/2021</a:t>
+              <a:t>9/12/2022</a:t>
             </a:fld>
             <a:endParaRPr lang="en-US"/>
           </a:p>
@@ -4310,7 +4310,7 @@
           <a:p>
             <a:fld id="{68854FD7-F343-4A42-89E7-0EA4AA30A707}" type="datetimeFigureOut">
               <a:rPr lang="en-US" smtClean="0"/>
-              <a:t>11/12/2021</a:t>
+              <a:t>9/12/2022</a:t>
             </a:fld>
             <a:endParaRPr lang="en-US"/>
           </a:p>
@@ -4573,7 +4573,7 @@
           <a:p>
             <a:fld id="{68854FD7-F343-4A42-89E7-0EA4AA30A707}" type="datetimeFigureOut">
               <a:rPr lang="en-US" smtClean="0"/>
-              <a:t>11/12/2021</a:t>
+              <a:t>9/12/2022</a:t>
             </a:fld>
             <a:endParaRPr lang="en-US"/>
           </a:p>
@@ -5316,7 +5316,7 @@
           <a:p>
             <a:fld id="{68854FD7-F343-4A42-89E7-0EA4AA30A707}" type="datetimeFigureOut">
               <a:rPr lang="en-US" smtClean="0"/>
-              <a:t>11/12/2021</a:t>
+              <a:t>9/12/2022</a:t>
             </a:fld>
             <a:endParaRPr lang="en-US"/>
           </a:p>
@@ -5845,7 +5845,7 @@
           <p:cNvPr id="4" name="Title 1">
             <a:extLst>
               <a:ext uri="{FF2B5EF4-FFF2-40B4-BE49-F238E27FC236}">
-                <a16:creationId xmlns:a16="http://schemas.microsoft.com/office/drawing/2014/main" xmlns="" id="{13B2D513-0F9C-4439-A697-A295339863B6}"/>
+                <a16:creationId xmlns="" xmlns:a16="http://schemas.microsoft.com/office/drawing/2014/main" id="{13B2D513-0F9C-4439-A697-A295339863B6}"/>
               </a:ext>
             </a:extLst>
           </p:cNvPr>
@@ -5888,7 +5888,7 @@
           <p:cNvPr id="5" name="Subtitle 2">
             <a:extLst>
               <a:ext uri="{FF2B5EF4-FFF2-40B4-BE49-F238E27FC236}">
-                <a16:creationId xmlns:a16="http://schemas.microsoft.com/office/drawing/2014/main" xmlns="" id="{37C9EE23-73D5-41F8-AFFF-4BA477FCB643}"/>
+                <a16:creationId xmlns="" xmlns:a16="http://schemas.microsoft.com/office/drawing/2014/main" id="{37C9EE23-73D5-41F8-AFFF-4BA477FCB643}"/>
               </a:ext>
             </a:extLst>
           </p:cNvPr>
@@ -6243,7 +6243,7 @@
           <p:cNvPr id="4" name="Title 1">
             <a:extLst>
               <a:ext uri="{FF2B5EF4-FFF2-40B4-BE49-F238E27FC236}">
-                <a16:creationId xmlns:a16="http://schemas.microsoft.com/office/drawing/2014/main" xmlns="" id="{AB45E17C-D635-444C-9E6E-9F0B20ABC34B}"/>
+                <a16:creationId xmlns="" xmlns:a16="http://schemas.microsoft.com/office/drawing/2014/main" id="{AB45E17C-D635-444C-9E6E-9F0B20ABC34B}"/>
               </a:ext>
             </a:extLst>
           </p:cNvPr>
@@ -6602,7 +6602,7 @@
           <p:cNvPr id="2" name="Title 1">
             <a:extLst>
               <a:ext uri="{FF2B5EF4-FFF2-40B4-BE49-F238E27FC236}">
-                <a16:creationId xmlns:a16="http://schemas.microsoft.com/office/drawing/2014/main" xmlns="" id="{AB45E17C-D635-444C-9E6E-9F0B20ABC34B}"/>
+                <a16:creationId xmlns="" xmlns:a16="http://schemas.microsoft.com/office/drawing/2014/main" id="{AB45E17C-D635-444C-9E6E-9F0B20ABC34B}"/>
               </a:ext>
             </a:extLst>
           </p:cNvPr>
@@ -7446,15 +7446,7 @@
           <a:p>
             <a:r>
               <a:rPr lang="en-US" dirty="0" err="1" smtClean="0"/>
-              <a:t>O</a:t>
-            </a:r>
-            <a:r>
-              <a:rPr lang="en-US" dirty="0" err="1" smtClean="0"/>
-              <a:t>stream</a:t>
-            </a:r>
-            <a:r>
-              <a:rPr lang="en-US" dirty="0" err="1" smtClean="0"/>
-              <a:t>_iterator</a:t>
+              <a:t>Ostream_iterator</a:t>
             </a:r>
             <a:r>
               <a:rPr lang="en-US" dirty="0"/>
@@ -7477,7 +7469,7 @@
           <p:cNvPr id="4" name="Title 1">
             <a:extLst>
               <a:ext uri="{FF2B5EF4-FFF2-40B4-BE49-F238E27FC236}">
-                <a16:creationId xmlns:a16="http://schemas.microsoft.com/office/drawing/2014/main" xmlns="" id="{AB45E17C-D635-444C-9E6E-9F0B20ABC34B}"/>
+                <a16:creationId xmlns="" xmlns:a16="http://schemas.microsoft.com/office/drawing/2014/main" id="{AB45E17C-D635-444C-9E6E-9F0B20ABC34B}"/>
               </a:ext>
             </a:extLst>
           </p:cNvPr>
@@ -8365,7 +8357,7 @@
           <p:cNvPr id="5" name="Title 1">
             <a:extLst>
               <a:ext uri="{FF2B5EF4-FFF2-40B4-BE49-F238E27FC236}">
-                <a16:creationId xmlns:a16="http://schemas.microsoft.com/office/drawing/2014/main" xmlns="" id="{C60BD838-89F7-4CB1-8B5E-1D5AD5FDEA16}"/>
+                <a16:creationId xmlns="" xmlns:a16="http://schemas.microsoft.com/office/drawing/2014/main" id="{C60BD838-89F7-4CB1-8B5E-1D5AD5FDEA16}"/>
               </a:ext>
             </a:extLst>
           </p:cNvPr>
@@ -8675,7 +8667,7 @@
           <p:cNvPr id="4" name="Title 1">
             <a:extLst>
               <a:ext uri="{FF2B5EF4-FFF2-40B4-BE49-F238E27FC236}">
-                <a16:creationId xmlns:a16="http://schemas.microsoft.com/office/drawing/2014/main" xmlns="" id="{C60BD838-89F7-4CB1-8B5E-1D5AD5FDEA16}"/>
+                <a16:creationId xmlns="" xmlns:a16="http://schemas.microsoft.com/office/drawing/2014/main" id="{C60BD838-89F7-4CB1-8B5E-1D5AD5FDEA16}"/>
               </a:ext>
             </a:extLst>
           </p:cNvPr>
@@ -10944,7 +10936,7 @@
           <p:cNvPr id="4" name="Title 1">
             <a:extLst>
               <a:ext uri="{FF2B5EF4-FFF2-40B4-BE49-F238E27FC236}">
-                <a16:creationId xmlns:a16="http://schemas.microsoft.com/office/drawing/2014/main" xmlns="" id="{C60BD838-89F7-4CB1-8B5E-1D5AD5FDEA16}"/>
+                <a16:creationId xmlns="" xmlns:a16="http://schemas.microsoft.com/office/drawing/2014/main" id="{C60BD838-89F7-4CB1-8B5E-1D5AD5FDEA16}"/>
               </a:ext>
             </a:extLst>
           </p:cNvPr>
@@ -11085,7 +11077,7 @@
           <p:cNvPr id="7" name="Picture 3">
             <a:extLst>
               <a:ext uri="{FF2B5EF4-FFF2-40B4-BE49-F238E27FC236}">
-                <a16:creationId xmlns:a16="http://schemas.microsoft.com/office/drawing/2014/main" xmlns="" id="{427BFC14-A2B9-4CB6-BE1C-0C70EF19CA05}"/>
+                <a16:creationId xmlns="" xmlns:a16="http://schemas.microsoft.com/office/drawing/2014/main" id="{427BFC14-A2B9-4CB6-BE1C-0C70EF19CA05}"/>
               </a:ext>
             </a:extLst>
           </p:cNvPr>
@@ -11144,7 +11136,7 @@
           <p:cNvPr id="4" name="Title 1">
             <a:extLst>
               <a:ext uri="{FF2B5EF4-FFF2-40B4-BE49-F238E27FC236}">
-                <a16:creationId xmlns:a16="http://schemas.microsoft.com/office/drawing/2014/main" xmlns="" id="{C60BD838-89F7-4CB1-8B5E-1D5AD5FDEA16}"/>
+                <a16:creationId xmlns="" xmlns:a16="http://schemas.microsoft.com/office/drawing/2014/main" id="{C60BD838-89F7-4CB1-8B5E-1D5AD5FDEA16}"/>
               </a:ext>
             </a:extLst>
           </p:cNvPr>
@@ -11273,7 +11265,7 @@
           <p:cNvPr id="12" name="Table 11">
             <a:extLst>
               <a:ext uri="{FF2B5EF4-FFF2-40B4-BE49-F238E27FC236}">
-                <a16:creationId xmlns:a16="http://schemas.microsoft.com/office/drawing/2014/main" xmlns="" id="{CCE7D441-96BC-4D6A-BE32-CEC98DB5865D}"/>
+                <a16:creationId xmlns="" xmlns:a16="http://schemas.microsoft.com/office/drawing/2014/main" id="{CCE7D441-96BC-4D6A-BE32-CEC98DB5865D}"/>
               </a:ext>
             </a:extLst>
           </p:cNvPr>
@@ -11302,28 +11294,28 @@
                 <a:gridCol w="3440783">
                   <a:extLst>
                     <a:ext uri="{9D8B030D-6E8A-4147-A177-3AD203B41FA5}">
-                      <a16:colId xmlns:a16="http://schemas.microsoft.com/office/drawing/2014/main" xmlns="" val="673896950"/>
+                      <a16:colId xmlns="" xmlns:a16="http://schemas.microsoft.com/office/drawing/2014/main" val="673896950"/>
                     </a:ext>
                   </a:extLst>
                 </a:gridCol>
                 <a:gridCol w="2554664">
                   <a:extLst>
                     <a:ext uri="{9D8B030D-6E8A-4147-A177-3AD203B41FA5}">
-                      <a16:colId xmlns:a16="http://schemas.microsoft.com/office/drawing/2014/main" xmlns="" val="3404116454"/>
+                      <a16:colId xmlns="" xmlns:a16="http://schemas.microsoft.com/office/drawing/2014/main" val="3404116454"/>
                     </a:ext>
                   </a:extLst>
                 </a:gridCol>
                 <a:gridCol w="2790334">
                   <a:extLst>
                     <a:ext uri="{9D8B030D-6E8A-4147-A177-3AD203B41FA5}">
-                      <a16:colId xmlns:a16="http://schemas.microsoft.com/office/drawing/2014/main" xmlns="" val="2546970233"/>
+                      <a16:colId xmlns="" xmlns:a16="http://schemas.microsoft.com/office/drawing/2014/main" val="2546970233"/>
                     </a:ext>
                   </a:extLst>
                 </a:gridCol>
                 <a:gridCol w="2686638">
                   <a:extLst>
                     <a:ext uri="{9D8B030D-6E8A-4147-A177-3AD203B41FA5}">
-                      <a16:colId xmlns:a16="http://schemas.microsoft.com/office/drawing/2014/main" xmlns="" val="1905818927"/>
+                      <a16:colId xmlns="" xmlns:a16="http://schemas.microsoft.com/office/drawing/2014/main" val="1905818927"/>
                     </a:ext>
                   </a:extLst>
                 </a:gridCol>
@@ -11387,7 +11379,7 @@
                 </a:tc>
                 <a:extLst>
                   <a:ext uri="{0D108BD9-81ED-4DB2-BD59-A6C34878D82A}">
-                    <a16:rowId xmlns:a16="http://schemas.microsoft.com/office/drawing/2014/main" xmlns="" val="3707840138"/>
+                    <a16:rowId xmlns="" xmlns:a16="http://schemas.microsoft.com/office/drawing/2014/main" val="3707840138"/>
                   </a:ext>
                 </a:extLst>
               </a:tr>
@@ -11554,7 +11546,7 @@
                 </a:tc>
                 <a:extLst>
                   <a:ext uri="{0D108BD9-81ED-4DB2-BD59-A6C34878D82A}">
-                    <a16:rowId xmlns:a16="http://schemas.microsoft.com/office/drawing/2014/main" xmlns="" val="541336909"/>
+                    <a16:rowId xmlns="" xmlns:a16="http://schemas.microsoft.com/office/drawing/2014/main" val="541336909"/>
                   </a:ext>
                 </a:extLst>
               </a:tr>
@@ -11671,7 +11663,7 @@
                 </a:tc>
                 <a:extLst>
                   <a:ext uri="{0D108BD9-81ED-4DB2-BD59-A6C34878D82A}">
-                    <a16:rowId xmlns:a16="http://schemas.microsoft.com/office/drawing/2014/main" xmlns="" val="2595382089"/>
+                    <a16:rowId xmlns="" xmlns:a16="http://schemas.microsoft.com/office/drawing/2014/main" val="2595382089"/>
                   </a:ext>
                 </a:extLst>
               </a:tr>
@@ -11825,7 +11817,7 @@
                 </a:tc>
                 <a:extLst>
                   <a:ext uri="{0D108BD9-81ED-4DB2-BD59-A6C34878D82A}">
-                    <a16:rowId xmlns:a16="http://schemas.microsoft.com/office/drawing/2014/main" xmlns="" val="1389121230"/>
+                    <a16:rowId xmlns="" xmlns:a16="http://schemas.microsoft.com/office/drawing/2014/main" val="1389121230"/>
                   </a:ext>
                 </a:extLst>
               </a:tr>
@@ -11954,7 +11946,7 @@
                 </a:tc>
                 <a:extLst>
                   <a:ext uri="{0D108BD9-81ED-4DB2-BD59-A6C34878D82A}">
-                    <a16:rowId xmlns:a16="http://schemas.microsoft.com/office/drawing/2014/main" xmlns="" val="4012556742"/>
+                    <a16:rowId xmlns="" xmlns:a16="http://schemas.microsoft.com/office/drawing/2014/main" val="4012556742"/>
                   </a:ext>
                 </a:extLst>
               </a:tr>
@@ -12244,7 +12236,7 @@
           <p:cNvPr id="3" name="Content Placeholder 2">
             <a:extLst>
               <a:ext uri="{FF2B5EF4-FFF2-40B4-BE49-F238E27FC236}">
-                <a16:creationId xmlns:a16="http://schemas.microsoft.com/office/drawing/2014/main" xmlns="" id="{26CEDBBB-DE92-40B8-B2B5-F45A320C25F4}"/>
+                <a16:creationId xmlns="" xmlns:a16="http://schemas.microsoft.com/office/drawing/2014/main" id="{26CEDBBB-DE92-40B8-B2B5-F45A320C25F4}"/>
               </a:ext>
             </a:extLst>
           </p:cNvPr>
@@ -12313,7 +12305,7 @@
           <p:cNvPr id="4" name="Title 1">
             <a:extLst>
               <a:ext uri="{FF2B5EF4-FFF2-40B4-BE49-F238E27FC236}">
-                <a16:creationId xmlns:a16="http://schemas.microsoft.com/office/drawing/2014/main" xmlns="" id="{65E8CEB3-E3E6-4768-8409-72F9C78EF2D5}"/>
+                <a16:creationId xmlns="" xmlns:a16="http://schemas.microsoft.com/office/drawing/2014/main" id="{65E8CEB3-E3E6-4768-8409-72F9C78EF2D5}"/>
               </a:ext>
             </a:extLst>
           </p:cNvPr>
@@ -12442,7 +12434,7 @@
           <p:cNvPr id="5" name="Picture 4">
             <a:extLst>
               <a:ext uri="{FF2B5EF4-FFF2-40B4-BE49-F238E27FC236}">
-                <a16:creationId xmlns:a16="http://schemas.microsoft.com/office/drawing/2014/main" xmlns="" id="{34A4F7A9-FB6D-4A56-A01D-FC2A9E6A3C9D}"/>
+                <a16:creationId xmlns="" xmlns:a16="http://schemas.microsoft.com/office/drawing/2014/main" id="{34A4F7A9-FB6D-4A56-A01D-FC2A9E6A3C9D}"/>
               </a:ext>
             </a:extLst>
           </p:cNvPr>
@@ -12472,7 +12464,7 @@
           <p:cNvPr id="6" name="Picture 5">
             <a:extLst>
               <a:ext uri="{FF2B5EF4-FFF2-40B4-BE49-F238E27FC236}">
-                <a16:creationId xmlns:a16="http://schemas.microsoft.com/office/drawing/2014/main" xmlns="" id="{F1E797CF-4454-4FBB-8EEA-F80C7C5FD663}"/>
+                <a16:creationId xmlns="" xmlns:a16="http://schemas.microsoft.com/office/drawing/2014/main" id="{F1E797CF-4454-4FBB-8EEA-F80C7C5FD663}"/>
               </a:ext>
             </a:extLst>
           </p:cNvPr>
@@ -12502,7 +12494,7 @@
           <p:cNvPr id="7" name="Content Placeholder 2">
             <a:extLst>
               <a:ext uri="{FF2B5EF4-FFF2-40B4-BE49-F238E27FC236}">
-                <a16:creationId xmlns:a16="http://schemas.microsoft.com/office/drawing/2014/main" xmlns="" id="{B4FAFC74-F36D-4B61-BE12-E6EFAC28AC60}"/>
+                <a16:creationId xmlns="" xmlns:a16="http://schemas.microsoft.com/office/drawing/2014/main" id="{B4FAFC74-F36D-4B61-BE12-E6EFAC28AC60}"/>
               </a:ext>
             </a:extLst>
           </p:cNvPr>
@@ -12843,7 +12835,7 @@
           <p:cNvPr id="4" name="Picture 3">
             <a:extLst>
               <a:ext uri="{FF2B5EF4-FFF2-40B4-BE49-F238E27FC236}">
-                <a16:creationId xmlns:a16="http://schemas.microsoft.com/office/drawing/2014/main" xmlns="" id="{7EBB1CAC-E82C-4575-A59E-808C14D22364}"/>
+                <a16:creationId xmlns="" xmlns:a16="http://schemas.microsoft.com/office/drawing/2014/main" id="{7EBB1CAC-E82C-4575-A59E-808C14D22364}"/>
               </a:ext>
             </a:extLst>
           </p:cNvPr>
@@ -12872,7 +12864,7 @@
           <p:cNvPr id="5" name="Title 1">
             <a:extLst>
               <a:ext uri="{FF2B5EF4-FFF2-40B4-BE49-F238E27FC236}">
-                <a16:creationId xmlns:a16="http://schemas.microsoft.com/office/drawing/2014/main" xmlns="" id="{AB45E17C-D635-444C-9E6E-9F0B20ABC34B}"/>
+                <a16:creationId xmlns="" xmlns:a16="http://schemas.microsoft.com/office/drawing/2014/main" id="{AB45E17C-D635-444C-9E6E-9F0B20ABC34B}"/>
               </a:ext>
             </a:extLst>
           </p:cNvPr>
@@ -12989,7 +12981,7 @@
           <p:cNvPr id="6" name="Picture 5">
             <a:extLst>
               <a:ext uri="{FF2B5EF4-FFF2-40B4-BE49-F238E27FC236}">
-                <a16:creationId xmlns:a16="http://schemas.microsoft.com/office/drawing/2014/main" xmlns="" id="{C590E18E-DB35-48A2-8D01-CCDDC5796071}"/>
+                <a16:creationId xmlns="" xmlns:a16="http://schemas.microsoft.com/office/drawing/2014/main" id="{C590E18E-DB35-48A2-8D01-CCDDC5796071}"/>
               </a:ext>
             </a:extLst>
           </p:cNvPr>
@@ -13019,7 +13011,7 @@
           <p:cNvPr id="7" name="Content Placeholder 2">
             <a:extLst>
               <a:ext uri="{FF2B5EF4-FFF2-40B4-BE49-F238E27FC236}">
-                <a16:creationId xmlns:a16="http://schemas.microsoft.com/office/drawing/2014/main" xmlns="" id="{6423B81A-58F9-4F18-87B4-FC1F266353F5}"/>
+                <a16:creationId xmlns="" xmlns:a16="http://schemas.microsoft.com/office/drawing/2014/main" id="{6423B81A-58F9-4F18-87B4-FC1F266353F5}"/>
               </a:ext>
             </a:extLst>
           </p:cNvPr>
@@ -13568,7 +13560,7 @@
           <p:cNvPr id="4" name="Title 1">
             <a:extLst>
               <a:ext uri="{FF2B5EF4-FFF2-40B4-BE49-F238E27FC236}">
-                <a16:creationId xmlns:a16="http://schemas.microsoft.com/office/drawing/2014/main" xmlns="" id="{AB45E17C-D635-444C-9E6E-9F0B20ABC34B}"/>
+                <a16:creationId xmlns="" xmlns:a16="http://schemas.microsoft.com/office/drawing/2014/main" id="{AB45E17C-D635-444C-9E6E-9F0B20ABC34B}"/>
               </a:ext>
             </a:extLst>
           </p:cNvPr>
@@ -13972,7 +13964,7 @@
           <p:cNvPr id="4" name="Title 1">
             <a:extLst>
               <a:ext uri="{FF2B5EF4-FFF2-40B4-BE49-F238E27FC236}">
-                <a16:creationId xmlns:a16="http://schemas.microsoft.com/office/drawing/2014/main" xmlns="" id="{AB45E17C-D635-444C-9E6E-9F0B20ABC34B}"/>
+                <a16:creationId xmlns="" xmlns:a16="http://schemas.microsoft.com/office/drawing/2014/main" id="{AB45E17C-D635-444C-9E6E-9F0B20ABC34B}"/>
               </a:ext>
             </a:extLst>
           </p:cNvPr>

</xml_diff>